<commit_message>
Slight changes in the presentation!
</commit_message>
<xml_diff>
--- a/TeamPaskal.pptx
+++ b/TeamPaskal.pptx
@@ -8013,6 +8013,18 @@
               <a:rPr lang="en-US" sz="3200" dirty="0" err="1" smtClean="0"/>
               <a:t>Dobreva</a:t>
             </a:r>
+            <a:r>
+              <a:rPr lang="bg-BG" sz="3200" dirty="0" smtClean="0"/>
+              <a:t> (</a:t>
+            </a:r>
+            <a:r>
+              <a:rPr lang="en-US" sz="3200" smtClean="0"/>
+              <a:t>called sick</a:t>
+            </a:r>
+            <a:r>
+              <a:rPr lang="bg-BG" sz="3200" smtClean="0"/>
+              <a:t>)</a:t>
+            </a:r>
             <a:endParaRPr lang="en-US" sz="3200" dirty="0" smtClean="0"/>
           </a:p>
         </p:txBody>
@@ -8087,7 +8099,15 @@
           <a:p>
             <a:r>
               <a:rPr lang="en-US" dirty="0" smtClean="0"/>
-              <a:t>Due to the diversity of abilities the contribution of each team member could not be expressed in that presentation, but can be found on project’s </a:t>
+              <a:t>Due to the diversity of abilities</a:t>
+            </a:r>
+            <a:r>
+              <a:rPr lang="bg-BG" dirty="0" smtClean="0"/>
+              <a:t>,</a:t>
+            </a:r>
+            <a:r>
+              <a:rPr lang="en-US" dirty="0" smtClean="0"/>
+              <a:t> the contribution of each team member could not be expressed in that presentation, but can be found on project’s </a:t>
             </a:r>
             <a:r>
               <a:rPr lang="en-US" dirty="0" err="1" smtClean="0"/>

</xml_diff>